<commit_message>
Update session 37 documents.
</commit_message>
<xml_diff>
--- a/CPSC-24700/Presentations/session-37.pptx
+++ b/CPSC-24700/Presentations/session-37.pptx
@@ -5,15 +5,16 @@
     <p:sldMasterId id="2147483648" r:id="rId1"/>
   </p:sldMasterIdLst>
   <p:notesMasterIdLst>
-    <p:notesMasterId r:id="rId8"/>
+    <p:notesMasterId r:id="rId9"/>
   </p:notesMasterIdLst>
   <p:sldIdLst>
     <p:sldId id="303" r:id="rId2"/>
     <p:sldId id="304" r:id="rId3"/>
-    <p:sldId id="306" r:id="rId4"/>
+    <p:sldId id="307" r:id="rId4"/>
     <p:sldId id="305" r:id="rId5"/>
-    <p:sldId id="301" r:id="rId6"/>
-    <p:sldId id="263" r:id="rId7"/>
+    <p:sldId id="308" r:id="rId6"/>
+    <p:sldId id="301" r:id="rId7"/>
+    <p:sldId id="263" r:id="rId8"/>
   </p:sldIdLst>
   <p:sldSz cx="12192000" cy="6858000"/>
   <p:notesSz cx="7315200" cy="9601200"/>
@@ -118,6 +119,10 @@
     </p:ext>
   </p:extLst>
 </p:presentation>
+</file>
+
+<file path=ppt/revisionInfo.xml><?xml version="1.0" encoding="utf-8"?>
+<p1510:revInfo xmlns:a="http://schemas.openxmlformats.org/drawingml/2006/main" xmlns:r="http://schemas.openxmlformats.org/officeDocument/2006/relationships" xmlns:p1510="http://schemas.microsoft.com/office/powerpoint/2015/10/main"/>
 </file>
 
 <file path=ppt/notesMasters/notesMaster1.xml><?xml version="1.0" encoding="utf-8"?>
@@ -681,7 +686,7 @@
           <a:bodyPr/>
           <a:lstStyle/>
           <a:p>
-            <a:endParaRPr lang="en-US" dirty="0"/>
+            <a:endParaRPr lang="en-US" sz="1000" dirty="0"/>
           </a:p>
         </p:txBody>
       </p:sp>
@@ -700,18 +705,18 @@
           <a:bodyPr/>
           <a:lstStyle/>
           <a:p>
-            <a:fld id="{5394DE12-7B9B-46AA-AC19-C30A49928B9B}" type="slidenum">
+            <a:fld id="{23B99BB9-C7F6-43B3-A122-46088ABB36FB}" type="slidenum">
               <a:rPr lang="en-US" smtClean="0"/>
               <a:t>3</a:t>
             </a:fld>
-            <a:endParaRPr lang="en-US" dirty="0"/>
+            <a:endParaRPr lang="en-US"/>
           </a:p>
         </p:txBody>
       </p:sp>
     </p:spTree>
     <p:extLst>
       <p:ext uri="{BB962C8B-B14F-4D97-AF65-F5344CB8AC3E}">
-        <p14:creationId xmlns:p14="http://schemas.microsoft.com/office/powerpoint/2010/main" val="1324298808"/>
+        <p14:creationId xmlns:p14="http://schemas.microsoft.com/office/powerpoint/2010/main" val="1303942175"/>
       </p:ext>
     </p:extLst>
   </p:cSld>
@@ -852,7 +857,7 @@
           <a:bodyPr/>
           <a:lstStyle/>
           <a:p>
-            <a:endParaRPr lang="en-US" sz="1000" dirty="0"/>
+            <a:endParaRPr lang="en-US" dirty="0"/>
           </a:p>
         </p:txBody>
       </p:sp>
@@ -871,18 +876,18 @@
           <a:bodyPr/>
           <a:lstStyle/>
           <a:p>
-            <a:fld id="{23B99BB9-C7F6-43B3-A122-46088ABB36FB}" type="slidenum">
+            <a:fld id="{5394DE12-7B9B-46AA-AC19-C30A49928B9B}" type="slidenum">
               <a:rPr lang="en-US" smtClean="0"/>
               <a:t>5</a:t>
             </a:fld>
-            <a:endParaRPr lang="en-US"/>
+            <a:endParaRPr lang="en-US" dirty="0"/>
           </a:p>
         </p:txBody>
       </p:sp>
     </p:spTree>
     <p:extLst>
       <p:ext uri="{BB962C8B-B14F-4D97-AF65-F5344CB8AC3E}">
-        <p14:creationId xmlns:p14="http://schemas.microsoft.com/office/powerpoint/2010/main" val="1809836636"/>
+        <p14:creationId xmlns:p14="http://schemas.microsoft.com/office/powerpoint/2010/main" val="4208518473"/>
       </p:ext>
     </p:extLst>
   </p:cSld>
@@ -936,6 +941,90 @@
           <a:bodyPr/>
           <a:lstStyle/>
           <a:p>
+            <a:endParaRPr lang="en-US" sz="1000" dirty="0"/>
+          </a:p>
+        </p:txBody>
+      </p:sp>
+      <p:sp>
+        <p:nvSpPr>
+          <p:cNvPr id="4" name="Slide Number Placeholder 3"/>
+          <p:cNvSpPr>
+            <a:spLocks noGrp="1"/>
+          </p:cNvSpPr>
+          <p:nvPr>
+            <p:ph type="sldNum" sz="quarter" idx="10"/>
+          </p:nvPr>
+        </p:nvSpPr>
+        <p:spPr/>
+        <p:txBody>
+          <a:bodyPr/>
+          <a:lstStyle/>
+          <a:p>
+            <a:fld id="{23B99BB9-C7F6-43B3-A122-46088ABB36FB}" type="slidenum">
+              <a:rPr lang="en-US" smtClean="0"/>
+              <a:t>6</a:t>
+            </a:fld>
+            <a:endParaRPr lang="en-US"/>
+          </a:p>
+        </p:txBody>
+      </p:sp>
+    </p:spTree>
+    <p:extLst>
+      <p:ext uri="{BB962C8B-B14F-4D97-AF65-F5344CB8AC3E}">
+        <p14:creationId xmlns:p14="http://schemas.microsoft.com/office/powerpoint/2010/main" val="1809836636"/>
+      </p:ext>
+    </p:extLst>
+  </p:cSld>
+  <p:clrMapOvr>
+    <a:masterClrMapping/>
+  </p:clrMapOvr>
+</p:notes>
+</file>
+
+<file path=ppt/notesSlides/notesSlide7.xml><?xml version="1.0" encoding="utf-8"?>
+<p:notes xmlns:a="http://schemas.openxmlformats.org/drawingml/2006/main" xmlns:r="http://schemas.openxmlformats.org/officeDocument/2006/relationships" xmlns:p="http://schemas.openxmlformats.org/presentationml/2006/main">
+  <p:cSld>
+    <p:spTree>
+      <p:nvGrpSpPr>
+        <p:cNvPr id="1" name=""/>
+        <p:cNvGrpSpPr/>
+        <p:nvPr/>
+      </p:nvGrpSpPr>
+      <p:grpSpPr>
+        <a:xfrm>
+          <a:off x="0" y="0"/>
+          <a:ext cx="0" cy="0"/>
+          <a:chOff x="0" y="0"/>
+          <a:chExt cx="0" cy="0"/>
+        </a:xfrm>
+      </p:grpSpPr>
+      <p:sp>
+        <p:nvSpPr>
+          <p:cNvPr id="2" name="Slide Image Placeholder 1"/>
+          <p:cNvSpPr>
+            <a:spLocks noGrp="1" noRot="1" noChangeAspect="1"/>
+          </p:cNvSpPr>
+          <p:nvPr>
+            <p:ph type="sldImg"/>
+          </p:nvPr>
+        </p:nvSpPr>
+        <p:spPr/>
+      </p:sp>
+      <p:sp>
+        <p:nvSpPr>
+          <p:cNvPr id="3" name="Notes Placeholder 2"/>
+          <p:cNvSpPr>
+            <a:spLocks noGrp="1"/>
+          </p:cNvSpPr>
+          <p:nvPr>
+            <p:ph type="body" idx="1"/>
+          </p:nvPr>
+        </p:nvSpPr>
+        <p:spPr/>
+        <p:txBody>
+          <a:bodyPr/>
+          <a:lstStyle/>
+          <a:p>
             <a:endParaRPr lang="en-US" dirty="0"/>
           </a:p>
         </p:txBody>
@@ -957,7 +1046,7 @@
           <a:p>
             <a:fld id="{5394DE12-7B9B-46AA-AC19-C30A49928B9B}" type="slidenum">
               <a:rPr lang="en-US" smtClean="0"/>
-              <a:t>6</a:t>
+              <a:t>7</a:t>
             </a:fld>
             <a:endParaRPr lang="en-US" dirty="0"/>
           </a:p>
@@ -4258,7 +4347,7 @@
         <p:spPr/>
         <p:txBody>
           <a:bodyPr>
-            <a:normAutofit/>
+            <a:normAutofit lnSpcReduction="10000"/>
           </a:bodyPr>
           <a:lstStyle/>
           <a:p>
@@ -4288,6 +4377,16 @@
             <a:r>
               <a:rPr lang="en-US" sz="2000" dirty="0"/>
               <a:t>Zip to City/State Demo?</a:t>
+            </a:r>
+          </a:p>
+          <a:p>
+            <a:pPr marL="457200" indent="-457200">
+              <a:buFont typeface="+mj-lt"/>
+              <a:buAutoNum type="arabicPeriod"/>
+            </a:pPr>
+            <a:r>
+              <a:rPr lang="en-US" sz="2000" dirty="0"/>
+              <a:t>Quick Review of Assignments From Last Class</a:t>
             </a:r>
           </a:p>
           <a:p>
@@ -4517,32 +4616,130 @@
       </p:grpSpPr>
       <p:sp>
         <p:nvSpPr>
-          <p:cNvPr id="2" name="Title 1"/>
-          <p:cNvSpPr>
-            <a:spLocks noGrp="1"/>
-          </p:cNvSpPr>
-          <p:nvPr>
-            <p:ph type="ctrTitle"/>
+          <p:cNvPr id="4" name="Title 1">
+            <a:extLst>
+              <a:ext uri="{FF2B5EF4-FFF2-40B4-BE49-F238E27FC236}">
+                <a16:creationId xmlns:a16="http://schemas.microsoft.com/office/drawing/2014/main" id="{527CE47F-3EF6-48CA-9239-E8B6E5C6B41A}"/>
+              </a:ext>
+            </a:extLst>
+          </p:cNvPr>
+          <p:cNvSpPr>
+            <a:spLocks noGrp="1"/>
+          </p:cNvSpPr>
+          <p:nvPr>
+            <p:ph type="title"/>
           </p:nvPr>
         </p:nvSpPr>
         <p:spPr>
           <a:xfrm>
-            <a:off x="1524000" y="1122362"/>
-            <a:ext cx="9144000" cy="2807612"/>
+            <a:off x="838200" y="365125"/>
+            <a:ext cx="10515600" cy="1325563"/>
           </a:xfrm>
         </p:spPr>
         <p:txBody>
           <a:bodyPr>
-            <a:noAutofit/>
+            <a:normAutofit/>
           </a:bodyPr>
           <a:lstStyle/>
           <a:p>
-            <a:br>
-              <a:rPr lang="en-US" sz="4000" dirty="0"/>
-            </a:br>
-            <a:r>
-              <a:rPr lang="en-US" sz="4000" dirty="0"/>
-              <a:t>Midterm 2 Comments</a:t>
+            <a:r>
+              <a:rPr lang="en-US" sz="3600" dirty="0"/>
+              <a:t>Assignment by Wednesday, Nov 29</a:t>
+            </a:r>
+          </a:p>
+        </p:txBody>
+      </p:sp>
+      <p:sp>
+        <p:nvSpPr>
+          <p:cNvPr id="5" name="Content Placeholder 2">
+            <a:extLst>
+              <a:ext uri="{FF2B5EF4-FFF2-40B4-BE49-F238E27FC236}">
+                <a16:creationId xmlns:a16="http://schemas.microsoft.com/office/drawing/2014/main" id="{E8F0EA9A-219C-40FD-AE36-784EE1B77D56}"/>
+              </a:ext>
+            </a:extLst>
+          </p:cNvPr>
+          <p:cNvSpPr>
+            <a:spLocks noGrp="1"/>
+          </p:cNvSpPr>
+          <p:nvPr>
+            <p:ph idx="1"/>
+          </p:nvPr>
+        </p:nvSpPr>
+        <p:spPr>
+          <a:xfrm>
+            <a:off x="838198" y="1525772"/>
+            <a:ext cx="10515601" cy="4651191"/>
+          </a:xfrm>
+        </p:spPr>
+        <p:txBody>
+          <a:bodyPr>
+            <a:normAutofit/>
+          </a:bodyPr>
+          <a:lstStyle/>
+          <a:p>
+            <a:pPr marL="0" indent="0">
+              <a:spcBef>
+                <a:spcPts val="4800"/>
+              </a:spcBef>
+              <a:buNone/>
+            </a:pPr>
+            <a:r>
+              <a:rPr lang="en-US" sz="2000" u="sng" dirty="0"/>
+              <a:t>Assignment:</a:t>
+            </a:r>
+            <a:endParaRPr lang="en-US" sz="2000" dirty="0"/>
+          </a:p>
+          <a:p>
+            <a:r>
+              <a:rPr lang="en-US" sz="2000" dirty="0"/>
+              <a:t>Ch.13.1 to 13.4 on Web Application access to Databases</a:t>
+            </a:r>
+          </a:p>
+          <a:p>
+            <a:r>
+              <a:rPr lang="en-US" sz="2000" dirty="0"/>
+              <a:t>Work on Project 5 &amp; Labs</a:t>
+            </a:r>
+          </a:p>
+          <a:p>
+            <a:r>
+              <a:rPr lang="en-US" sz="2000" dirty="0"/>
+              <a:t>Complete </a:t>
+            </a:r>
+          </a:p>
+          <a:p>
+            <a:pPr marL="0" indent="0">
+              <a:buNone/>
+            </a:pPr>
+            <a:r>
+              <a:rPr lang="en-US" sz="2000" dirty="0"/>
+              <a:t>	Week 12 Lab: Static Website in Azure</a:t>
+            </a:r>
+          </a:p>
+          <a:p>
+            <a:pPr marL="0" indent="0">
+              <a:buNone/>
+            </a:pPr>
+            <a:r>
+              <a:rPr lang="en-US" sz="2000" dirty="0"/>
+              <a:t>	Week 13a Lab: Create a </a:t>
+            </a:r>
+            <a:r>
+              <a:rPr lang="nl-NL" sz="2000" dirty="0"/>
+              <a:t>Node.js web in Azure OR</a:t>
+            </a:r>
+          </a:p>
+          <a:p>
+            <a:pPr marL="0" indent="0">
+              <a:buNone/>
+            </a:pPr>
+            <a:r>
+              <a:rPr lang="nl-NL" sz="2000" dirty="0"/>
+              <a:t>	</a:t>
+            </a:r>
+            <a:r>
+              <a:rPr lang="en-US" sz="2000" dirty="0"/>
+              <a:t>Week 13b Lab: Create a PHP web app in Azure </a:t>
             </a:r>
           </a:p>
         </p:txBody>
@@ -4550,7 +4747,7 @@
     </p:spTree>
     <p:extLst>
       <p:ext uri="{BB962C8B-B14F-4D97-AF65-F5344CB8AC3E}">
-        <p14:creationId xmlns:p14="http://schemas.microsoft.com/office/powerpoint/2010/main" val="3807035143"/>
+        <p14:creationId xmlns:p14="http://schemas.microsoft.com/office/powerpoint/2010/main" val="892811373"/>
       </p:ext>
     </p:extLst>
   </p:cSld>
@@ -4674,6 +4871,68 @@
       </p:grpSpPr>
       <p:sp>
         <p:nvSpPr>
+          <p:cNvPr id="2" name="Title 1"/>
+          <p:cNvSpPr>
+            <a:spLocks noGrp="1"/>
+          </p:cNvSpPr>
+          <p:nvPr>
+            <p:ph type="ctrTitle"/>
+          </p:nvPr>
+        </p:nvSpPr>
+        <p:spPr>
+          <a:xfrm>
+            <a:off x="1524000" y="1122362"/>
+            <a:ext cx="9144000" cy="2807612"/>
+          </a:xfrm>
+        </p:spPr>
+        <p:txBody>
+          <a:bodyPr>
+            <a:noAutofit/>
+          </a:bodyPr>
+          <a:lstStyle/>
+          <a:p>
+            <a:br>
+              <a:rPr lang="en-US" sz="4000" dirty="0"/>
+            </a:br>
+            <a:r>
+              <a:rPr lang="en-US" sz="4000" dirty="0"/>
+              <a:t>Database</a:t>
+            </a:r>
+          </a:p>
+        </p:txBody>
+      </p:sp>
+    </p:spTree>
+    <p:extLst>
+      <p:ext uri="{BB962C8B-B14F-4D97-AF65-F5344CB8AC3E}">
+        <p14:creationId xmlns:p14="http://schemas.microsoft.com/office/powerpoint/2010/main" val="3410816818"/>
+      </p:ext>
+    </p:extLst>
+  </p:cSld>
+  <p:clrMapOvr>
+    <a:masterClrMapping/>
+  </p:clrMapOvr>
+</p:sld>
+</file>
+
+<file path=ppt/slides/slide6.xml><?xml version="1.0" encoding="utf-8"?>
+<p:sld xmlns:a="http://schemas.openxmlformats.org/drawingml/2006/main" xmlns:r="http://schemas.openxmlformats.org/officeDocument/2006/relationships" xmlns:p="http://schemas.openxmlformats.org/presentationml/2006/main">
+  <p:cSld>
+    <p:spTree>
+      <p:nvGrpSpPr>
+        <p:cNvPr id="1" name=""/>
+        <p:cNvGrpSpPr/>
+        <p:nvPr/>
+      </p:nvGrpSpPr>
+      <p:grpSpPr>
+        <a:xfrm>
+          <a:off x="0" y="0"/>
+          <a:ext cx="0" cy="0"/>
+          <a:chOff x="0" y="0"/>
+          <a:chExt cx="0" cy="0"/>
+        </a:xfrm>
+      </p:grpSpPr>
+      <p:sp>
+        <p:nvSpPr>
           <p:cNvPr id="4" name="Title 1">
             <a:extLst>
               <a:ext uri="{FF2B5EF4-FFF2-40B4-BE49-F238E27FC236}">
@@ -4702,7 +4961,7 @@
           <a:p>
             <a:r>
               <a:rPr lang="en-US" sz="3600" dirty="0"/>
-              <a:t>Assignment by Wednesday, Nov 29</a:t>
+              <a:t>Assignment by Friday, Dec 1</a:t>
             </a:r>
           </a:p>
         </p:txBody>
@@ -4750,54 +5009,13 @@
           <a:p>
             <a:r>
               <a:rPr lang="en-US" sz="2000" dirty="0"/>
-              <a:t>Ch.13.1 to 13.4 on Web Application access to Databases</a:t>
+              <a:t>Ch.13.5 to 13.6 on Web Application access to Databases</a:t>
             </a:r>
           </a:p>
           <a:p>
             <a:r>
               <a:rPr lang="en-US" sz="2000" dirty="0"/>
-              <a:t>Work on Project 5 &amp; Labs</a:t>
-            </a:r>
-          </a:p>
-          <a:p>
-            <a:r>
-              <a:rPr lang="en-US" sz="2000" dirty="0"/>
-              <a:t>Complete </a:t>
-            </a:r>
-          </a:p>
-          <a:p>
-            <a:pPr marL="0" indent="0">
-              <a:buNone/>
-            </a:pPr>
-            <a:r>
-              <a:rPr lang="en-US" sz="2000" dirty="0"/>
-              <a:t>	Week 12 Lab: Static Website in Azure</a:t>
-            </a:r>
-          </a:p>
-          <a:p>
-            <a:pPr marL="0" indent="0">
-              <a:buNone/>
-            </a:pPr>
-            <a:r>
-              <a:rPr lang="en-US" sz="2000" dirty="0"/>
-              <a:t>	Week 13a Lab: Create a </a:t>
-            </a:r>
-            <a:r>
-              <a:rPr lang="nl-NL" sz="2000" dirty="0"/>
-              <a:t>Node.js web in Azure OR</a:t>
-            </a:r>
-          </a:p>
-          <a:p>
-            <a:pPr marL="0" indent="0">
-              <a:buNone/>
-            </a:pPr>
-            <a:r>
-              <a:rPr lang="nl-NL" sz="2000" dirty="0"/>
-              <a:t>	</a:t>
-            </a:r>
-            <a:r>
-              <a:rPr lang="en-US" sz="2000" dirty="0"/>
-              <a:t>Week 13b Lab: Create a PHP web app in Azure </a:t>
+              <a:t>Continue to focus on Project 5… which is due one week from today</a:t>
             </a:r>
           </a:p>
         </p:txBody>
@@ -4815,7 +5033,7 @@
 </p:sld>
 </file>
 
-<file path=ppt/slides/slide6.xml><?xml version="1.0" encoding="utf-8"?>
+<file path=ppt/slides/slide7.xml><?xml version="1.0" encoding="utf-8"?>
 <p:sld xmlns:a="http://schemas.openxmlformats.org/drawingml/2006/main" xmlns:r="http://schemas.openxmlformats.org/officeDocument/2006/relationships" xmlns:p="http://schemas.openxmlformats.org/presentationml/2006/main">
   <p:cSld>
     <p:bg>

</xml_diff>